<commit_message>
changing size of plots
</commit_message>
<xml_diff>
--- a/plots/Fig3.pptx
+++ b/plots/Fig3.pptx
@@ -112,6 +112,11 @@
             <a:srgbClr val="A4A3A4"/>
           </p15:clr>
         </p15:guide>
+        <p15:guide id="2" pos="2160">
+          <p15:clr>
+            <a:srgbClr val="A4A3A4"/>
+          </p15:clr>
+        </p15:guide>
       </p15:sldGuideLst>
     </p:ext>
   </p:extLst>
@@ -249,7 +254,7 @@
           <a:p>
             <a:fld id="{2EA2911C-3394-1F4D-8873-E7938CAA67D5}" type="datetimeFigureOut">
               <a:rPr lang="en-GB" smtClean="0"/>
-              <a:t>12/04/2022</a:t>
+              <a:t>14/04/2022</a:t>
             </a:fld>
             <a:endParaRPr lang="en-GB"/>
           </a:p>
@@ -419,7 +424,7 @@
           <a:p>
             <a:fld id="{2EA2911C-3394-1F4D-8873-E7938CAA67D5}" type="datetimeFigureOut">
               <a:rPr lang="en-GB" smtClean="0"/>
-              <a:t>12/04/2022</a:t>
+              <a:t>14/04/2022</a:t>
             </a:fld>
             <a:endParaRPr lang="en-GB"/>
           </a:p>
@@ -599,7 +604,7 @@
           <a:p>
             <a:fld id="{2EA2911C-3394-1F4D-8873-E7938CAA67D5}" type="datetimeFigureOut">
               <a:rPr lang="en-GB" smtClean="0"/>
-              <a:t>12/04/2022</a:t>
+              <a:t>14/04/2022</a:t>
             </a:fld>
             <a:endParaRPr lang="en-GB"/>
           </a:p>
@@ -769,7 +774,7 @@
           <a:p>
             <a:fld id="{2EA2911C-3394-1F4D-8873-E7938CAA67D5}" type="datetimeFigureOut">
               <a:rPr lang="en-GB" smtClean="0"/>
-              <a:t>12/04/2022</a:t>
+              <a:t>14/04/2022</a:t>
             </a:fld>
             <a:endParaRPr lang="en-GB"/>
           </a:p>
@@ -1013,7 +1018,7 @@
           <a:p>
             <a:fld id="{2EA2911C-3394-1F4D-8873-E7938CAA67D5}" type="datetimeFigureOut">
               <a:rPr lang="en-GB" smtClean="0"/>
-              <a:t>12/04/2022</a:t>
+              <a:t>14/04/2022</a:t>
             </a:fld>
             <a:endParaRPr lang="en-GB"/>
           </a:p>
@@ -1245,7 +1250,7 @@
           <a:p>
             <a:fld id="{2EA2911C-3394-1F4D-8873-E7938CAA67D5}" type="datetimeFigureOut">
               <a:rPr lang="en-GB" smtClean="0"/>
-              <a:t>12/04/2022</a:t>
+              <a:t>14/04/2022</a:t>
             </a:fld>
             <a:endParaRPr lang="en-GB"/>
           </a:p>
@@ -1612,7 +1617,7 @@
           <a:p>
             <a:fld id="{2EA2911C-3394-1F4D-8873-E7938CAA67D5}" type="datetimeFigureOut">
               <a:rPr lang="en-GB" smtClean="0"/>
-              <a:t>12/04/2022</a:t>
+              <a:t>14/04/2022</a:t>
             </a:fld>
             <a:endParaRPr lang="en-GB"/>
           </a:p>
@@ -1730,7 +1735,7 @@
           <a:p>
             <a:fld id="{2EA2911C-3394-1F4D-8873-E7938CAA67D5}" type="datetimeFigureOut">
               <a:rPr lang="en-GB" smtClean="0"/>
-              <a:t>12/04/2022</a:t>
+              <a:t>14/04/2022</a:t>
             </a:fld>
             <a:endParaRPr lang="en-GB"/>
           </a:p>
@@ -1825,7 +1830,7 @@
           <a:p>
             <a:fld id="{2EA2911C-3394-1F4D-8873-E7938CAA67D5}" type="datetimeFigureOut">
               <a:rPr lang="en-GB" smtClean="0"/>
-              <a:t>12/04/2022</a:t>
+              <a:t>14/04/2022</a:t>
             </a:fld>
             <a:endParaRPr lang="en-GB"/>
           </a:p>
@@ -2102,7 +2107,7 @@
           <a:p>
             <a:fld id="{2EA2911C-3394-1F4D-8873-E7938CAA67D5}" type="datetimeFigureOut">
               <a:rPr lang="en-GB" smtClean="0"/>
-              <a:t>12/04/2022</a:t>
+              <a:t>14/04/2022</a:t>
             </a:fld>
             <a:endParaRPr lang="en-GB"/>
           </a:p>
@@ -2359,7 +2364,7 @@
           <a:p>
             <a:fld id="{2EA2911C-3394-1F4D-8873-E7938CAA67D5}" type="datetimeFigureOut">
               <a:rPr lang="en-GB" smtClean="0"/>
-              <a:t>12/04/2022</a:t>
+              <a:t>14/04/2022</a:t>
             </a:fld>
             <a:endParaRPr lang="en-GB"/>
           </a:p>
@@ -2572,7 +2577,7 @@
           <a:p>
             <a:fld id="{2EA2911C-3394-1F4D-8873-E7938CAA67D5}" type="datetimeFigureOut">
               <a:rPr lang="en-GB" smtClean="0"/>
-              <a:t>12/04/2022</a:t>
+              <a:t>14/04/2022</a:t>
             </a:fld>
             <a:endParaRPr lang="en-GB"/>
           </a:p>
@@ -2998,7 +3003,7 @@
         </p:blipFill>
         <p:spPr>
           <a:xfrm>
-            <a:off x="3340484" y="6902229"/>
+            <a:off x="3340484" y="6838279"/>
             <a:ext cx="3517516" cy="3419061"/>
           </a:xfrm>
           <a:prstGeom prst="rect">
@@ -3057,7 +3062,7 @@
         </p:nvSpPr>
         <p:spPr>
           <a:xfrm>
-            <a:off x="3056782" y="3220281"/>
+            <a:off x="3056782" y="3303443"/>
             <a:ext cx="372218" cy="461665"/>
           </a:xfrm>
           <a:prstGeom prst="rect">
@@ -3094,7 +3099,7 @@
         </p:nvSpPr>
         <p:spPr>
           <a:xfrm>
-            <a:off x="3056782" y="6821035"/>
+            <a:off x="3060430" y="6723064"/>
             <a:ext cx="372218" cy="461665"/>
           </a:xfrm>
           <a:prstGeom prst="rect">
@@ -3148,10 +3153,10 @@
       </p:pic>
       <p:pic>
         <p:nvPicPr>
-          <p:cNvPr id="8" name="Picture 7">
+          <p:cNvPr id="4" name="Picture 3">
             <a:extLst>
               <a:ext uri="{FF2B5EF4-FFF2-40B4-BE49-F238E27FC236}">
-                <a16:creationId xmlns:a16="http://schemas.microsoft.com/office/drawing/2014/main" id="{D1E1C94C-6939-8144-8CF1-0CE9274A24F5}"/>
+                <a16:creationId xmlns:a16="http://schemas.microsoft.com/office/drawing/2014/main" id="{3890232F-BC3A-77CA-E1B6-57EFB392190F}"/>
               </a:ext>
             </a:extLst>
           </p:cNvPr>
@@ -3162,13 +3167,13 @@
         </p:nvPicPr>
         <p:blipFill rotWithShape="1">
           <a:blip r:embed="rId4"/>
-          <a:srcRect l="3894" t="3837" r="4878" b="6807"/>
+          <a:srcRect l="4286" t="4446" r="5080" b="6349"/>
           <a:stretch/>
         </p:blipFill>
         <p:spPr>
           <a:xfrm>
-            <a:off x="3384780" y="3419061"/>
-            <a:ext cx="3473220" cy="3401974"/>
+            <a:off x="3340484" y="3419218"/>
+            <a:ext cx="3473815" cy="3419061"/>
           </a:xfrm>
           <a:prstGeom prst="rect">
             <a:avLst/>

</xml_diff>